<commit_message>
Fixed typo and updated presentation
Co-Authored-By: 99orazio <63792973+99orazio@users.noreply.github.com>
Co-Authored-By: Vincenzo Emanuele Martone <72343574+vincenzo-emanuele@users.noreply.github.com>
</commit_message>
<xml_diff>
--- a/Presentazione Finale.pptx
+++ b/Presentazione Finale.pptx
@@ -5,10 +5,10 @@
     <p:sldMasterId id="2147483660" r:id="rId4"/>
   </p:sldMasterIdLst>
   <p:notesMasterIdLst>
-    <p:notesMasterId r:id="rId28"/>
+    <p:notesMasterId r:id="rId29"/>
   </p:notesMasterIdLst>
   <p:handoutMasterIdLst>
-    <p:handoutMasterId r:id="rId29"/>
+    <p:handoutMasterId r:id="rId30"/>
   </p:handoutMasterIdLst>
   <p:sldIdLst>
     <p:sldId id="257" r:id="rId5"/>
@@ -29,11 +29,12 @@
     <p:sldId id="273" r:id="rId20"/>
     <p:sldId id="274" r:id="rId21"/>
     <p:sldId id="275" r:id="rId22"/>
-    <p:sldId id="276" r:id="rId23"/>
-    <p:sldId id="277" r:id="rId24"/>
-    <p:sldId id="278" r:id="rId25"/>
-    <p:sldId id="279" r:id="rId26"/>
-    <p:sldId id="280" r:id="rId27"/>
+    <p:sldId id="281" r:id="rId23"/>
+    <p:sldId id="276" r:id="rId24"/>
+    <p:sldId id="277" r:id="rId25"/>
+    <p:sldId id="278" r:id="rId26"/>
+    <p:sldId id="279" r:id="rId27"/>
+    <p:sldId id="280" r:id="rId28"/>
   </p:sldIdLst>
   <p:sldSz cx="12188825" cy="6858000"/>
   <p:notesSz cx="6858000" cy="9144000"/>
@@ -1264,7 +1265,7 @@
               <c:strCache>
                 <c:ptCount val="1"/>
                 <c:pt idx="0">
-                  <c:v>bzip2</c:v>
+                  <c:v>bzip2 (pipeline)</c:v>
                 </c:pt>
               </c:strCache>
             </c:strRef>
@@ -1381,34 +1382,34 @@
                 <c:formatCode>0.00%</c:formatCode>
                 <c:ptCount val="10"/>
                 <c:pt idx="0">
-                  <c:v>0.71609999999999996</c:v>
+                  <c:v>0.64070000000000005</c:v>
                 </c:pt>
                 <c:pt idx="1">
-                  <c:v>0.68389999999999995</c:v>
+                  <c:v>0.60129999999999995</c:v>
                 </c:pt>
                 <c:pt idx="2">
-                  <c:v>0.69010000000000005</c:v>
+                  <c:v>0.61109999999999998</c:v>
                 </c:pt>
                 <c:pt idx="3">
-                  <c:v>0.72740000000000005</c:v>
+                  <c:v>0.64219999999999999</c:v>
                 </c:pt>
                 <c:pt idx="4">
-                  <c:v>0.6552</c:v>
+                  <c:v>0.5474</c:v>
                 </c:pt>
                 <c:pt idx="5">
-                  <c:v>0.69799999999999995</c:v>
+                  <c:v>0.61050000000000004</c:v>
                 </c:pt>
                 <c:pt idx="6">
-                  <c:v>0.74319999999999997</c:v>
+                  <c:v>0.65639999999999998</c:v>
                 </c:pt>
                 <c:pt idx="7">
-                  <c:v>0.90820000000000001</c:v>
+                  <c:v>0.87429999999999997</c:v>
                 </c:pt>
                 <c:pt idx="8">
-                  <c:v>0.69799999999999995</c:v>
+                  <c:v>0.6079</c:v>
                 </c:pt>
                 <c:pt idx="9">
-                  <c:v>0.66959999999999997</c:v>
+                  <c:v>0.57779999999999998</c:v>
                 </c:pt>
               </c:numCache>
             </c:numRef>
@@ -1613,6 +1614,645 @@
 </file>
 
 <file path=ppt/charts/chart2.xml><?xml version="1.0" encoding="utf-8"?>
+<c:chartSpace xmlns:c="http://schemas.openxmlformats.org/drawingml/2006/chart" xmlns:a="http://schemas.openxmlformats.org/drawingml/2006/main" xmlns:r="http://schemas.openxmlformats.org/officeDocument/2006/relationships" xmlns:c16r2="http://schemas.microsoft.com/office/drawing/2015/06/chart">
+  <c:date1904 val="0"/>
+  <c:lang val="it-IT"/>
+  <c:roundedCorners val="0"/>
+  <mc:AlternateContent xmlns:mc="http://schemas.openxmlformats.org/markup-compatibility/2006">
+    <mc:Choice xmlns:c14="http://schemas.microsoft.com/office/drawing/2007/8/2/chart" Requires="c14">
+      <c14:style val="102"/>
+    </mc:Choice>
+    <mc:Fallback>
+      <c:style val="2"/>
+    </mc:Fallback>
+  </mc:AlternateContent>
+  <c:chart>
+    <c:title>
+      <c:tx>
+        <c:rich>
+          <a:bodyPr rot="0" spcFirstLastPara="1" vertOverflow="ellipsis" vert="horz" wrap="square" anchor="ctr" anchorCtr="1"/>
+          <a:lstStyle/>
+          <a:p>
+            <a:pPr>
+              <a:defRPr sz="1862" b="0" i="0" u="none" strike="noStrike" kern="1200" spc="0" baseline="0">
+                <a:solidFill>
+                  <a:schemeClr val="tx1">
+                    <a:lumMod val="65000"/>
+                    <a:lumOff val="35000"/>
+                  </a:schemeClr>
+                </a:solidFill>
+                <a:latin typeface="+mn-lt"/>
+                <a:ea typeface="+mn-ea"/>
+                <a:cs typeface="+mn-cs"/>
+              </a:defRPr>
+            </a:pPr>
+            <a:r>
+              <a:rPr lang="it-IT" dirty="0"/>
+              <a:t>Rapporto di compressione</a:t>
+            </a:r>
+          </a:p>
+        </c:rich>
+      </c:tx>
+      <c:layout>
+        <c:manualLayout>
+          <c:xMode val="edge"/>
+          <c:yMode val="edge"/>
+          <c:x val="0.34511798958014095"/>
+          <c:y val="1.7075771832730041E-2"/>
+        </c:manualLayout>
+      </c:layout>
+      <c:overlay val="0"/>
+      <c:spPr>
+        <a:noFill/>
+        <a:ln>
+          <a:noFill/>
+        </a:ln>
+        <a:effectLst/>
+      </c:spPr>
+      <c:txPr>
+        <a:bodyPr rot="0" spcFirstLastPara="1" vertOverflow="ellipsis" vert="horz" wrap="square" anchor="ctr" anchorCtr="1"/>
+        <a:lstStyle/>
+        <a:p>
+          <a:pPr>
+            <a:defRPr sz="1862" b="0" i="0" u="none" strike="noStrike" kern="1200" spc="0" baseline="0">
+              <a:solidFill>
+                <a:schemeClr val="tx1">
+                  <a:lumMod val="65000"/>
+                  <a:lumOff val="35000"/>
+                </a:schemeClr>
+              </a:solidFill>
+              <a:latin typeface="+mn-lt"/>
+              <a:ea typeface="+mn-ea"/>
+              <a:cs typeface="+mn-cs"/>
+            </a:defRPr>
+          </a:pPr>
+          <a:endParaRPr lang="it-IT"/>
+        </a:p>
+      </c:txPr>
+    </c:title>
+    <c:autoTitleDeleted val="0"/>
+    <c:plotArea>
+      <c:layout>
+        <c:manualLayout>
+          <c:layoutTarget val="inner"/>
+          <c:xMode val="edge"/>
+          <c:yMode val="edge"/>
+          <c:x val="7.4126462050043321E-2"/>
+          <c:y val="0.12816800946024651"/>
+          <c:w val="0.91361488027297233"/>
+          <c:h val="0.71766421368647759"/>
+        </c:manualLayout>
+      </c:layout>
+      <c:barChart>
+        <c:barDir val="col"/>
+        <c:grouping val="clustered"/>
+        <c:varyColors val="0"/>
+        <c:ser>
+          <c:idx val="0"/>
+          <c:order val="0"/>
+          <c:tx>
+            <c:strRef>
+              <c:f>Foglio1!$B$1</c:f>
+              <c:strCache>
+                <c:ptCount val="1"/>
+                <c:pt idx="0">
+                  <c:v>bzip2 (pipeline)</c:v>
+                </c:pt>
+              </c:strCache>
+            </c:strRef>
+          </c:tx>
+          <c:spPr>
+            <a:solidFill>
+              <a:schemeClr val="accent1"/>
+            </a:solidFill>
+            <a:ln>
+              <a:noFill/>
+            </a:ln>
+            <a:effectLst/>
+          </c:spPr>
+          <c:invertIfNegative val="0"/>
+          <c:dLbls>
+            <c:spPr>
+              <a:noFill/>
+              <a:ln>
+                <a:noFill/>
+              </a:ln>
+              <a:effectLst/>
+            </c:spPr>
+            <c:txPr>
+              <a:bodyPr rot="0" spcFirstLastPara="1" vertOverflow="ellipsis" vert="horz" wrap="square" lIns="38100" tIns="19050" rIns="38100" bIns="19050" anchor="ctr" anchorCtr="1">
+                <a:spAutoFit/>
+              </a:bodyPr>
+              <a:lstStyle/>
+              <a:p>
+                <a:pPr>
+                  <a:defRPr sz="1197" b="0" i="0" u="none" strike="noStrike" kern="1200" baseline="0">
+                    <a:solidFill>
+                      <a:schemeClr val="tx1">
+                        <a:lumMod val="75000"/>
+                        <a:lumOff val="25000"/>
+                      </a:schemeClr>
+                    </a:solidFill>
+                    <a:latin typeface="+mn-lt"/>
+                    <a:ea typeface="+mn-ea"/>
+                    <a:cs typeface="+mn-cs"/>
+                  </a:defRPr>
+                </a:pPr>
+                <a:endParaRPr lang="it-IT"/>
+              </a:p>
+            </c:txPr>
+            <c:dLblPos val="outEnd"/>
+            <c:showLegendKey val="0"/>
+            <c:showVal val="1"/>
+            <c:showCatName val="0"/>
+            <c:showSerName val="0"/>
+            <c:showPercent val="0"/>
+            <c:showBubbleSize val="0"/>
+            <c:showLeaderLines val="0"/>
+            <c:extLst>
+              <c:ext xmlns:c15="http://schemas.microsoft.com/office/drawing/2012/chart" uri="{CE6537A1-D6FC-4f65-9D91-7224C49458BB}">
+                <c15:showLeaderLines val="1"/>
+                <c15:leaderLines>
+                  <c:spPr>
+                    <a:ln w="9525" cap="flat" cmpd="sng" algn="ctr">
+                      <a:solidFill>
+                        <a:schemeClr val="tx1">
+                          <a:lumMod val="35000"/>
+                          <a:lumOff val="65000"/>
+                        </a:schemeClr>
+                      </a:solidFill>
+                      <a:round/>
+                    </a:ln>
+                    <a:effectLst/>
+                  </c:spPr>
+                </c15:leaderLines>
+              </c:ext>
+            </c:extLst>
+          </c:dLbls>
+          <c:cat>
+            <c:strRef>
+              <c:f>Foglio1!$A$2:$A$11</c:f>
+              <c:strCache>
+                <c:ptCount val="10"/>
+                <c:pt idx="0">
+                  <c:v>alice29.txt</c:v>
+                </c:pt>
+                <c:pt idx="1">
+                  <c:v>asyoulik.txt</c:v>
+                </c:pt>
+                <c:pt idx="2">
+                  <c:v>cp.html</c:v>
+                </c:pt>
+                <c:pt idx="3">
+                  <c:v>fields.c</c:v>
+                </c:pt>
+                <c:pt idx="4">
+                  <c:v>grammar.lsp</c:v>
+                </c:pt>
+                <c:pt idx="5">
+                  <c:v>huffman.c</c:v>
+                </c:pt>
+                <c:pt idx="6">
+                  <c:v>lcet10.txt</c:v>
+                </c:pt>
+                <c:pt idx="7">
+                  <c:v>manual.ps</c:v>
+                </c:pt>
+                <c:pt idx="8">
+                  <c:v>plrabn12.txt</c:v>
+                </c:pt>
+                <c:pt idx="9">
+                  <c:v>shrek.txt</c:v>
+                </c:pt>
+              </c:strCache>
+            </c:strRef>
+          </c:cat>
+          <c:val>
+            <c:numRef>
+              <c:f>Foglio1!$B$2:$B$11</c:f>
+              <c:numCache>
+                <c:formatCode>0.00%</c:formatCode>
+                <c:ptCount val="10"/>
+                <c:pt idx="0">
+                  <c:v>0.64070000000000005</c:v>
+                </c:pt>
+                <c:pt idx="1">
+                  <c:v>0.60129999999999995</c:v>
+                </c:pt>
+                <c:pt idx="2">
+                  <c:v>0.61109999999999998</c:v>
+                </c:pt>
+                <c:pt idx="3">
+                  <c:v>0.64219999999999999</c:v>
+                </c:pt>
+                <c:pt idx="4">
+                  <c:v>0.5474</c:v>
+                </c:pt>
+                <c:pt idx="5">
+                  <c:v>0.61050000000000004</c:v>
+                </c:pt>
+                <c:pt idx="6">
+                  <c:v>0.65639999999999998</c:v>
+                </c:pt>
+                <c:pt idx="7">
+                  <c:v>0.87429999999999997</c:v>
+                </c:pt>
+                <c:pt idx="8">
+                  <c:v>0.6079</c:v>
+                </c:pt>
+                <c:pt idx="9">
+                  <c:v>0.57779999999999998</c:v>
+                </c:pt>
+              </c:numCache>
+            </c:numRef>
+          </c:val>
+          <c:extLst>
+            <c:ext xmlns:c16="http://schemas.microsoft.com/office/drawing/2014/chart" uri="{C3380CC4-5D6E-409C-BE32-E72D297353CC}">
+              <c16:uniqueId val="{00000007-C50F-4BC4-A8D7-E1A7B121220F}"/>
+            </c:ext>
+          </c:extLst>
+        </c:ser>
+        <c:ser>
+          <c:idx val="1"/>
+          <c:order val="1"/>
+          <c:tx>
+            <c:strRef>
+              <c:f>Foglio1!$C$1</c:f>
+              <c:strCache>
+                <c:ptCount val="1"/>
+                <c:pt idx="0">
+                  <c:v>bzip2 (da solo)</c:v>
+                </c:pt>
+              </c:strCache>
+            </c:strRef>
+          </c:tx>
+          <c:spPr>
+            <a:solidFill>
+              <a:schemeClr val="accent2"/>
+            </a:solidFill>
+            <a:ln>
+              <a:noFill/>
+            </a:ln>
+            <a:effectLst/>
+          </c:spPr>
+          <c:invertIfNegative val="0"/>
+          <c:dLbls>
+            <c:dLbl>
+              <c:idx val="7"/>
+              <c:layout>
+                <c:manualLayout>
+                  <c:x val="8.5810603738890583E-3"/>
+                  <c:y val="-5.6919239442433473E-3"/>
+                </c:manualLayout>
+              </c:layout>
+              <c:dLblPos val="outEnd"/>
+              <c:showLegendKey val="0"/>
+              <c:showVal val="1"/>
+              <c:showCatName val="0"/>
+              <c:showSerName val="0"/>
+              <c:showPercent val="0"/>
+              <c:showBubbleSize val="0"/>
+              <c:extLst>
+                <c:ext xmlns:c15="http://schemas.microsoft.com/office/drawing/2012/chart" uri="{CE6537A1-D6FC-4f65-9D91-7224C49458BB}"/>
+                <c:ext xmlns:c16="http://schemas.microsoft.com/office/drawing/2014/chart" uri="{C3380CC4-5D6E-409C-BE32-E72D297353CC}">
+                  <c16:uniqueId val="{0000000F-C50F-4BC4-A8D7-E1A7B121220F}"/>
+                </c:ext>
+              </c:extLst>
+            </c:dLbl>
+            <c:spPr>
+              <a:noFill/>
+              <a:ln>
+                <a:noFill/>
+              </a:ln>
+              <a:effectLst/>
+            </c:spPr>
+            <c:txPr>
+              <a:bodyPr rot="0" spcFirstLastPara="1" vertOverflow="ellipsis" vert="horz" wrap="square" lIns="38100" tIns="19050" rIns="38100" bIns="19050" anchor="ctr" anchorCtr="1">
+                <a:spAutoFit/>
+              </a:bodyPr>
+              <a:lstStyle/>
+              <a:p>
+                <a:pPr>
+                  <a:defRPr sz="1197" b="0" i="0" u="none" strike="noStrike" kern="1200" baseline="0">
+                    <a:solidFill>
+                      <a:schemeClr val="tx1">
+                        <a:lumMod val="75000"/>
+                        <a:lumOff val="25000"/>
+                      </a:schemeClr>
+                    </a:solidFill>
+                    <a:latin typeface="+mn-lt"/>
+                    <a:ea typeface="+mn-ea"/>
+                    <a:cs typeface="+mn-cs"/>
+                  </a:defRPr>
+                </a:pPr>
+                <a:endParaRPr lang="it-IT"/>
+              </a:p>
+            </c:txPr>
+            <c:dLblPos val="outEnd"/>
+            <c:showLegendKey val="0"/>
+            <c:showVal val="1"/>
+            <c:showCatName val="0"/>
+            <c:showSerName val="0"/>
+            <c:showPercent val="0"/>
+            <c:showBubbleSize val="0"/>
+            <c:showLeaderLines val="0"/>
+            <c:extLst>
+              <c:ext xmlns:c15="http://schemas.microsoft.com/office/drawing/2012/chart" uri="{CE6537A1-D6FC-4f65-9D91-7224C49458BB}">
+                <c15:showLeaderLines val="1"/>
+                <c15:leaderLines>
+                  <c:spPr>
+                    <a:ln w="9525" cap="flat" cmpd="sng" algn="ctr">
+                      <a:solidFill>
+                        <a:schemeClr val="tx1">
+                          <a:lumMod val="35000"/>
+                          <a:lumOff val="65000"/>
+                        </a:schemeClr>
+                      </a:solidFill>
+                      <a:round/>
+                    </a:ln>
+                    <a:effectLst/>
+                  </c:spPr>
+                </c15:leaderLines>
+              </c:ext>
+            </c:extLst>
+          </c:dLbls>
+          <c:cat>
+            <c:strRef>
+              <c:f>Foglio1!$A$2:$A$11</c:f>
+              <c:strCache>
+                <c:ptCount val="10"/>
+                <c:pt idx="0">
+                  <c:v>alice29.txt</c:v>
+                </c:pt>
+                <c:pt idx="1">
+                  <c:v>asyoulik.txt</c:v>
+                </c:pt>
+                <c:pt idx="2">
+                  <c:v>cp.html</c:v>
+                </c:pt>
+                <c:pt idx="3">
+                  <c:v>fields.c</c:v>
+                </c:pt>
+                <c:pt idx="4">
+                  <c:v>grammar.lsp</c:v>
+                </c:pt>
+                <c:pt idx="5">
+                  <c:v>huffman.c</c:v>
+                </c:pt>
+                <c:pt idx="6">
+                  <c:v>lcet10.txt</c:v>
+                </c:pt>
+                <c:pt idx="7">
+                  <c:v>manual.ps</c:v>
+                </c:pt>
+                <c:pt idx="8">
+                  <c:v>plrabn12.txt</c:v>
+                </c:pt>
+                <c:pt idx="9">
+                  <c:v>shrek.txt</c:v>
+                </c:pt>
+              </c:strCache>
+            </c:strRef>
+          </c:cat>
+          <c:val>
+            <c:numRef>
+              <c:f>Foglio1!$C$2:$C$11</c:f>
+              <c:numCache>
+                <c:formatCode>0.00%</c:formatCode>
+                <c:ptCount val="10"/>
+                <c:pt idx="0">
+                  <c:v>0.71609999999999996</c:v>
+                </c:pt>
+                <c:pt idx="1">
+                  <c:v>0.68389999999999995</c:v>
+                </c:pt>
+                <c:pt idx="2">
+                  <c:v>0.69010000000000005</c:v>
+                </c:pt>
+                <c:pt idx="3">
+                  <c:v>0.72740000000000005</c:v>
+                </c:pt>
+                <c:pt idx="4">
+                  <c:v>0.6552</c:v>
+                </c:pt>
+                <c:pt idx="5">
+                  <c:v>0.69799999999999995</c:v>
+                </c:pt>
+                <c:pt idx="6">
+                  <c:v>0.74319999999999997</c:v>
+                </c:pt>
+                <c:pt idx="7">
+                  <c:v>0.90820000000000001</c:v>
+                </c:pt>
+                <c:pt idx="8">
+                  <c:v>0.69799999999999995</c:v>
+                </c:pt>
+                <c:pt idx="9">
+                  <c:v>0.66959999999999997</c:v>
+                </c:pt>
+              </c:numCache>
+            </c:numRef>
+          </c:val>
+          <c:extLst>
+            <c:ext xmlns:c16="http://schemas.microsoft.com/office/drawing/2014/chart" uri="{C3380CC4-5D6E-409C-BE32-E72D297353CC}">
+              <c16:uniqueId val="{00000012-C50F-4BC4-A8D7-E1A7B121220F}"/>
+            </c:ext>
+          </c:extLst>
+        </c:ser>
+        <c:dLbls>
+          <c:showLegendKey val="0"/>
+          <c:showVal val="0"/>
+          <c:showCatName val="0"/>
+          <c:showSerName val="0"/>
+          <c:showPercent val="0"/>
+          <c:showBubbleSize val="0"/>
+        </c:dLbls>
+        <c:gapWidth val="240"/>
+        <c:overlap val="-27"/>
+        <c:axId val="903738528"/>
+        <c:axId val="800090928"/>
+      </c:barChart>
+      <c:catAx>
+        <c:axId val="903738528"/>
+        <c:scaling>
+          <c:orientation val="minMax"/>
+        </c:scaling>
+        <c:delete val="0"/>
+        <c:axPos val="b"/>
+        <c:numFmt formatCode="General" sourceLinked="1"/>
+        <c:majorTickMark val="none"/>
+        <c:minorTickMark val="none"/>
+        <c:tickLblPos val="nextTo"/>
+        <c:spPr>
+          <a:noFill/>
+          <a:ln w="9525" cap="flat" cmpd="sng" algn="ctr">
+            <a:solidFill>
+              <a:schemeClr val="tx1">
+                <a:lumMod val="15000"/>
+                <a:lumOff val="85000"/>
+              </a:schemeClr>
+            </a:solidFill>
+            <a:round/>
+          </a:ln>
+          <a:effectLst/>
+        </c:spPr>
+        <c:txPr>
+          <a:bodyPr rot="-60000000" spcFirstLastPara="1" vertOverflow="ellipsis" vert="horz" wrap="square" anchor="ctr" anchorCtr="1"/>
+          <a:lstStyle/>
+          <a:p>
+            <a:pPr>
+              <a:defRPr sz="1197" b="0" i="0" u="none" strike="noStrike" kern="1200" baseline="0">
+                <a:solidFill>
+                  <a:schemeClr val="tx1">
+                    <a:lumMod val="65000"/>
+                    <a:lumOff val="35000"/>
+                  </a:schemeClr>
+                </a:solidFill>
+                <a:latin typeface="+mn-lt"/>
+                <a:ea typeface="+mn-ea"/>
+                <a:cs typeface="+mn-cs"/>
+              </a:defRPr>
+            </a:pPr>
+            <a:endParaRPr lang="it-IT"/>
+          </a:p>
+        </c:txPr>
+        <c:crossAx val="800090928"/>
+        <c:crosses val="autoZero"/>
+        <c:auto val="1"/>
+        <c:lblAlgn val="ctr"/>
+        <c:lblOffset val="100"/>
+        <c:noMultiLvlLbl val="0"/>
+      </c:catAx>
+      <c:valAx>
+        <c:axId val="800090928"/>
+        <c:scaling>
+          <c:orientation val="minMax"/>
+        </c:scaling>
+        <c:delete val="0"/>
+        <c:axPos val="l"/>
+        <c:majorGridlines>
+          <c:spPr>
+            <a:ln w="9525" cap="flat" cmpd="sng" algn="ctr">
+              <a:solidFill>
+                <a:schemeClr val="tx1">
+                  <a:lumMod val="15000"/>
+                  <a:lumOff val="85000"/>
+                </a:schemeClr>
+              </a:solidFill>
+              <a:round/>
+            </a:ln>
+            <a:effectLst/>
+          </c:spPr>
+        </c:majorGridlines>
+        <c:numFmt formatCode="0.00%" sourceLinked="1"/>
+        <c:majorTickMark val="none"/>
+        <c:minorTickMark val="none"/>
+        <c:tickLblPos val="nextTo"/>
+        <c:spPr>
+          <a:noFill/>
+          <a:ln>
+            <a:noFill/>
+          </a:ln>
+          <a:effectLst/>
+        </c:spPr>
+        <c:txPr>
+          <a:bodyPr rot="-60000000" spcFirstLastPara="1" vertOverflow="ellipsis" vert="horz" wrap="square" anchor="ctr" anchorCtr="1"/>
+          <a:lstStyle/>
+          <a:p>
+            <a:pPr>
+              <a:defRPr sz="1197" b="0" i="0" u="none" strike="noStrike" kern="1200" baseline="0">
+                <a:solidFill>
+                  <a:schemeClr val="tx1">
+                    <a:lumMod val="65000"/>
+                    <a:lumOff val="35000"/>
+                  </a:schemeClr>
+                </a:solidFill>
+                <a:latin typeface="+mn-lt"/>
+                <a:ea typeface="+mn-ea"/>
+                <a:cs typeface="+mn-cs"/>
+              </a:defRPr>
+            </a:pPr>
+            <a:endParaRPr lang="it-IT"/>
+          </a:p>
+        </c:txPr>
+        <c:crossAx val="903738528"/>
+        <c:crosses val="autoZero"/>
+        <c:crossBetween val="between"/>
+      </c:valAx>
+      <c:spPr>
+        <a:noFill/>
+        <a:ln>
+          <a:noFill/>
+        </a:ln>
+        <a:effectLst/>
+      </c:spPr>
+    </c:plotArea>
+    <c:legend>
+      <c:legendPos val="b"/>
+      <c:overlay val="0"/>
+      <c:spPr>
+        <a:noFill/>
+        <a:ln>
+          <a:noFill/>
+        </a:ln>
+        <a:effectLst/>
+      </c:spPr>
+      <c:txPr>
+        <a:bodyPr rot="0" spcFirstLastPara="1" vertOverflow="ellipsis" vert="horz" wrap="square" anchor="ctr" anchorCtr="1"/>
+        <a:lstStyle/>
+        <a:p>
+          <a:pPr>
+            <a:defRPr sz="1197" b="0" i="0" u="none" strike="noStrike" kern="1200" baseline="0">
+              <a:solidFill>
+                <a:schemeClr val="tx1">
+                  <a:lumMod val="65000"/>
+                  <a:lumOff val="35000"/>
+                </a:schemeClr>
+              </a:solidFill>
+              <a:latin typeface="+mn-lt"/>
+              <a:ea typeface="+mn-ea"/>
+              <a:cs typeface="+mn-cs"/>
+            </a:defRPr>
+          </a:pPr>
+          <a:endParaRPr lang="it-IT"/>
+        </a:p>
+      </c:txPr>
+    </c:legend>
+    <c:plotVisOnly val="1"/>
+    <c:dispBlanksAs val="gap"/>
+    <c:extLst>
+      <c:ext xmlns:c16r3="http://schemas.microsoft.com/office/drawing/2017/03/chart" uri="{56B9EC1D-385E-4148-901F-78D8002777C0}">
+        <c16r3:dataDisplayOptions16>
+          <c16r3:dispNaAsBlank val="1"/>
+        </c16r3:dataDisplayOptions16>
+      </c:ext>
+    </c:extLst>
+    <c:showDLblsOverMax val="0"/>
+  </c:chart>
+  <c:spPr>
+    <a:noFill/>
+    <a:ln>
+      <a:noFill/>
+    </a:ln>
+    <a:effectLst/>
+  </c:spPr>
+  <c:txPr>
+    <a:bodyPr/>
+    <a:lstStyle/>
+    <a:p>
+      <a:pPr>
+        <a:defRPr/>
+      </a:pPr>
+      <a:endParaRPr lang="it-IT"/>
+    </a:p>
+  </c:txPr>
+  <c:externalData r:id="rId3">
+    <c:autoUpdate val="0"/>
+  </c:externalData>
+</c:chartSpace>
+</file>
+
+<file path=ppt/charts/chart3.xml><?xml version="1.0" encoding="utf-8"?>
 <c:chartSpace xmlns:c="http://schemas.openxmlformats.org/drawingml/2006/chart" xmlns:a="http://schemas.openxmlformats.org/drawingml/2006/main" xmlns:r="http://schemas.openxmlformats.org/officeDocument/2006/relationships" xmlns:c16r2="http://schemas.microsoft.com/office/drawing/2015/06/chart">
   <c:date1904 val="0"/>
   <c:lang val="it-IT"/>
@@ -2617,7 +3257,7 @@
               <c:strCache>
                 <c:ptCount val="1"/>
                 <c:pt idx="0">
-                  <c:v>bzip2</c:v>
+                  <c:v>bzip2 (pipeline)</c:v>
                 </c:pt>
               </c:strCache>
             </c:strRef>
@@ -2755,34 +3395,34 @@
                 <c:formatCode>General</c:formatCode>
                 <c:ptCount val="10"/>
                 <c:pt idx="0">
-                  <c:v>1.6E-2</c:v>
+                  <c:v>0.04</c:v>
                 </c:pt>
                 <c:pt idx="1">
-                  <c:v>1.2999999999999999E-2</c:v>
+                  <c:v>0.03</c:v>
                 </c:pt>
                 <c:pt idx="2">
-                  <c:v>3.0000000000000001E-3</c:v>
+                  <c:v>0.01</c:v>
                 </c:pt>
                 <c:pt idx="3">
-                  <c:v>2E-3</c:v>
+                  <c:v>0.01</c:v>
                 </c:pt>
                 <c:pt idx="4">
-                  <c:v>8.9999999999999998E-4</c:v>
+                  <c:v>0.01</c:v>
                 </c:pt>
                 <c:pt idx="5">
-                  <c:v>1E-3</c:v>
+                  <c:v>0.01</c:v>
                 </c:pt>
                 <c:pt idx="6">
-                  <c:v>0.03</c:v>
+                  <c:v>0.09</c:v>
                 </c:pt>
                 <c:pt idx="7">
-                  <c:v>0.37</c:v>
+                  <c:v>0.2</c:v>
                 </c:pt>
                 <c:pt idx="8">
-                  <c:v>0.04</c:v>
+                  <c:v>0.12</c:v>
                 </c:pt>
                 <c:pt idx="9">
-                  <c:v>6.0000000000000001E-3</c:v>
+                  <c:v>0.02</c:v>
                 </c:pt>
               </c:numCache>
             </c:numRef>
@@ -2930,9 +3570,9 @@
         <c:manualLayout>
           <c:xMode val="edge"/>
           <c:yMode val="edge"/>
-          <c:x val="0.43363534354405514"/>
-          <c:y val="0.95042684014309708"/>
-          <c:w val="0.22941064331408467"/>
+          <c:x val="0.32330742445119581"/>
+          <c:y val="0.95042683872972267"/>
+          <c:w val="0.29928499207289555"/>
           <c:h val="4.7611309747025758E-2"/>
         </c:manualLayout>
       </c:layout>
@@ -2999,7 +3639,7 @@
 </c:chartSpace>
 </file>
 
-<file path=ppt/charts/chart3.xml><?xml version="1.0" encoding="utf-8"?>
+<file path=ppt/charts/chart4.xml><?xml version="1.0" encoding="utf-8"?>
 <c:chartSpace xmlns:c="http://schemas.openxmlformats.org/drawingml/2006/chart" xmlns:a="http://schemas.openxmlformats.org/drawingml/2006/main" xmlns:r="http://schemas.openxmlformats.org/officeDocument/2006/relationships" xmlns:c16r2="http://schemas.microsoft.com/office/drawing/2015/06/chart">
   <c:date1904 val="0"/>
   <c:lang val="it-IT"/>
@@ -3933,7 +4573,7 @@
               <c:strCache>
                 <c:ptCount val="1"/>
                 <c:pt idx="0">
-                  <c:v>bzip2</c:v>
+                  <c:v>bzip2 (pipeline)</c:v>
                 </c:pt>
               </c:strCache>
             </c:strRef>
@@ -4071,34 +4711,34 @@
                 <c:formatCode>General</c:formatCode>
                 <c:ptCount val="10"/>
                 <c:pt idx="0">
-                  <c:v>5.0000000000000001E-3</c:v>
+                  <c:v>0.03</c:v>
                 </c:pt>
                 <c:pt idx="1">
-                  <c:v>4.0000000000000001E-3</c:v>
+                  <c:v>0.03</c:v>
                 </c:pt>
                 <c:pt idx="2">
-                  <c:v>6.9999999999999999E-4</c:v>
+                  <c:v>0.01</c:v>
                 </c:pt>
                 <c:pt idx="3">
-                  <c:v>2.9999999999999997E-4</c:v>
+                  <c:v>0.01</c:v>
                 </c:pt>
                 <c:pt idx="4">
-                  <c:v>2.0000000000000001E-4</c:v>
+                  <c:v>0.01</c:v>
                 </c:pt>
                 <c:pt idx="5">
-                  <c:v>2.9999999999999997E-4</c:v>
+                  <c:v>0.01</c:v>
                 </c:pt>
                 <c:pt idx="6">
-                  <c:v>8.9999999999999993E-3</c:v>
+                  <c:v>0.08</c:v>
                 </c:pt>
                 <c:pt idx="7">
-                  <c:v>0.03</c:v>
+                  <c:v>0.18</c:v>
                 </c:pt>
                 <c:pt idx="8">
-                  <c:v>0.01</c:v>
+                  <c:v>0.11</c:v>
                 </c:pt>
                 <c:pt idx="9">
-                  <c:v>3.0000000000000001E-3</c:v>
+                  <c:v>0.02</c:v>
                 </c:pt>
               </c:numCache>
             </c:numRef>
@@ -4241,6 +4881,16 @@
     </c:plotArea>
     <c:legend>
       <c:legendPos val="b"/>
+      <c:layout>
+        <c:manualLayout>
+          <c:xMode val="edge"/>
+          <c:yMode val="edge"/>
+          <c:x val="0.34606692551417589"/>
+          <c:y val="0.92468464164296715"/>
+          <c:w val="0.26863834788043467"/>
+          <c:h val="5.8239586524302833E-2"/>
+        </c:manualLayout>
+      </c:layout>
       <c:overlay val="0"/>
       <c:spPr>
         <a:noFill/>
@@ -4385,6 +5035,46 @@
 </file>
 
 <file path=ppt/charts/colors3.xml><?xml version="1.0" encoding="utf-8"?>
+<cs:colorStyle xmlns:cs="http://schemas.microsoft.com/office/drawing/2012/chartStyle" xmlns:a="http://schemas.openxmlformats.org/drawingml/2006/main" meth="cycle" id="10">
+  <a:schemeClr val="accent1"/>
+  <a:schemeClr val="accent2"/>
+  <a:schemeClr val="accent3"/>
+  <a:schemeClr val="accent4"/>
+  <a:schemeClr val="accent5"/>
+  <a:schemeClr val="accent6"/>
+  <cs:variation/>
+  <cs:variation>
+    <a:lumMod val="60000"/>
+  </cs:variation>
+  <cs:variation>
+    <a:lumMod val="80000"/>
+    <a:lumOff val="20000"/>
+  </cs:variation>
+  <cs:variation>
+    <a:lumMod val="80000"/>
+  </cs:variation>
+  <cs:variation>
+    <a:lumMod val="60000"/>
+    <a:lumOff val="40000"/>
+  </cs:variation>
+  <cs:variation>
+    <a:lumMod val="50000"/>
+  </cs:variation>
+  <cs:variation>
+    <a:lumMod val="70000"/>
+    <a:lumOff val="30000"/>
+  </cs:variation>
+  <cs:variation>
+    <a:lumMod val="70000"/>
+  </cs:variation>
+  <cs:variation>
+    <a:lumMod val="50000"/>
+    <a:lumOff val="50000"/>
+  </cs:variation>
+</cs:colorStyle>
+</file>
+
+<file path=ppt/charts/colors4.xml><?xml version="1.0" encoding="utf-8"?>
 <cs:colorStyle xmlns:cs="http://schemas.microsoft.com/office/drawing/2012/chartStyle" xmlns:a="http://schemas.openxmlformats.org/drawingml/2006/main" meth="cycle" id="10">
   <a:schemeClr val="accent1"/>
   <a:schemeClr val="accent2"/>
@@ -5933,6 +6623,509 @@
 </cs:chartStyle>
 </file>
 
+<file path=ppt/charts/style4.xml><?xml version="1.0" encoding="utf-8"?>
+<cs:chartStyle xmlns:cs="http://schemas.microsoft.com/office/drawing/2012/chartStyle" xmlns:a="http://schemas.openxmlformats.org/drawingml/2006/main" id="201">
+  <cs:axisTitle>
+    <cs:lnRef idx="0"/>
+    <cs:fillRef idx="0"/>
+    <cs:effectRef idx="0"/>
+    <cs:fontRef idx="minor">
+      <a:schemeClr val="tx1">
+        <a:lumMod val="65000"/>
+        <a:lumOff val="35000"/>
+      </a:schemeClr>
+    </cs:fontRef>
+    <cs:defRPr sz="1330" kern="1200"/>
+  </cs:axisTitle>
+  <cs:categoryAxis>
+    <cs:lnRef idx="0"/>
+    <cs:fillRef idx="0"/>
+    <cs:effectRef idx="0"/>
+    <cs:fontRef idx="minor">
+      <a:schemeClr val="tx1">
+        <a:lumMod val="65000"/>
+        <a:lumOff val="35000"/>
+      </a:schemeClr>
+    </cs:fontRef>
+    <cs:spPr>
+      <a:ln w="9525" cap="flat" cmpd="sng" algn="ctr">
+        <a:solidFill>
+          <a:schemeClr val="tx1">
+            <a:lumMod val="15000"/>
+            <a:lumOff val="85000"/>
+          </a:schemeClr>
+        </a:solidFill>
+        <a:round/>
+      </a:ln>
+    </cs:spPr>
+    <cs:defRPr sz="1197" kern="1200"/>
+  </cs:categoryAxis>
+  <cs:chartArea mods="allowNoFillOverride allowNoLineOverride">
+    <cs:lnRef idx="0"/>
+    <cs:fillRef idx="0"/>
+    <cs:effectRef idx="0"/>
+    <cs:fontRef idx="minor">
+      <a:schemeClr val="tx1"/>
+    </cs:fontRef>
+    <cs:spPr>
+      <a:solidFill>
+        <a:schemeClr val="bg1"/>
+      </a:solidFill>
+      <a:ln w="9525" cap="flat" cmpd="sng" algn="ctr">
+        <a:solidFill>
+          <a:schemeClr val="tx1">
+            <a:lumMod val="15000"/>
+            <a:lumOff val="85000"/>
+          </a:schemeClr>
+        </a:solidFill>
+        <a:round/>
+      </a:ln>
+    </cs:spPr>
+    <cs:defRPr sz="1330" kern="1200"/>
+  </cs:chartArea>
+  <cs:dataLabel>
+    <cs:lnRef idx="0"/>
+    <cs:fillRef idx="0"/>
+    <cs:effectRef idx="0"/>
+    <cs:fontRef idx="minor">
+      <a:schemeClr val="tx1">
+        <a:lumMod val="75000"/>
+        <a:lumOff val="25000"/>
+      </a:schemeClr>
+    </cs:fontRef>
+    <cs:defRPr sz="1197" kern="1200"/>
+  </cs:dataLabel>
+  <cs:dataLabelCallout>
+    <cs:lnRef idx="0"/>
+    <cs:fillRef idx="0"/>
+    <cs:effectRef idx="0"/>
+    <cs:fontRef idx="minor">
+      <a:schemeClr val="dk1">
+        <a:lumMod val="65000"/>
+        <a:lumOff val="35000"/>
+      </a:schemeClr>
+    </cs:fontRef>
+    <cs:spPr>
+      <a:solidFill>
+        <a:schemeClr val="lt1"/>
+      </a:solidFill>
+      <a:ln>
+        <a:solidFill>
+          <a:schemeClr val="dk1">
+            <a:lumMod val="25000"/>
+            <a:lumOff val="75000"/>
+          </a:schemeClr>
+        </a:solidFill>
+      </a:ln>
+    </cs:spPr>
+    <cs:defRPr sz="1197" kern="1200"/>
+    <cs:bodyPr rot="0" spcFirstLastPara="1" vertOverflow="clip" horzOverflow="clip" vert="horz" wrap="square" lIns="36576" tIns="18288" rIns="36576" bIns="18288" anchor="ctr" anchorCtr="1">
+      <a:spAutoFit/>
+    </cs:bodyPr>
+  </cs:dataLabelCallout>
+  <cs:dataPoint>
+    <cs:lnRef idx="0"/>
+    <cs:fillRef idx="1">
+      <cs:styleClr val="auto"/>
+    </cs:fillRef>
+    <cs:effectRef idx="0"/>
+    <cs:fontRef idx="minor">
+      <a:schemeClr val="tx1"/>
+    </cs:fontRef>
+  </cs:dataPoint>
+  <cs:dataPoint3D>
+    <cs:lnRef idx="0"/>
+    <cs:fillRef idx="1">
+      <cs:styleClr val="auto"/>
+    </cs:fillRef>
+    <cs:effectRef idx="0"/>
+    <cs:fontRef idx="minor">
+      <a:schemeClr val="tx1"/>
+    </cs:fontRef>
+  </cs:dataPoint3D>
+  <cs:dataPointLine>
+    <cs:lnRef idx="0">
+      <cs:styleClr val="auto"/>
+    </cs:lnRef>
+    <cs:fillRef idx="1"/>
+    <cs:effectRef idx="0"/>
+    <cs:fontRef idx="minor">
+      <a:schemeClr val="tx1"/>
+    </cs:fontRef>
+    <cs:spPr>
+      <a:ln w="28575" cap="rnd">
+        <a:solidFill>
+          <a:schemeClr val="phClr"/>
+        </a:solidFill>
+        <a:round/>
+      </a:ln>
+    </cs:spPr>
+  </cs:dataPointLine>
+  <cs:dataPointMarker>
+    <cs:lnRef idx="0">
+      <cs:styleClr val="auto"/>
+    </cs:lnRef>
+    <cs:fillRef idx="1">
+      <cs:styleClr val="auto"/>
+    </cs:fillRef>
+    <cs:effectRef idx="0"/>
+    <cs:fontRef idx="minor">
+      <a:schemeClr val="tx1"/>
+    </cs:fontRef>
+    <cs:spPr>
+      <a:ln w="9525">
+        <a:solidFill>
+          <a:schemeClr val="phClr"/>
+        </a:solidFill>
+      </a:ln>
+    </cs:spPr>
+  </cs:dataPointMarker>
+  <cs:dataPointMarkerLayout symbol="circle" size="5"/>
+  <cs:dataPointWireframe>
+    <cs:lnRef idx="0">
+      <cs:styleClr val="auto"/>
+    </cs:lnRef>
+    <cs:fillRef idx="1"/>
+    <cs:effectRef idx="0"/>
+    <cs:fontRef idx="minor">
+      <a:schemeClr val="tx1"/>
+    </cs:fontRef>
+    <cs:spPr>
+      <a:ln w="9525" cap="rnd">
+        <a:solidFill>
+          <a:schemeClr val="phClr"/>
+        </a:solidFill>
+        <a:round/>
+      </a:ln>
+    </cs:spPr>
+  </cs:dataPointWireframe>
+  <cs:dataTable>
+    <cs:lnRef idx="0"/>
+    <cs:fillRef idx="0"/>
+    <cs:effectRef idx="0"/>
+    <cs:fontRef idx="minor">
+      <a:schemeClr val="tx1">
+        <a:lumMod val="65000"/>
+        <a:lumOff val="35000"/>
+      </a:schemeClr>
+    </cs:fontRef>
+    <cs:spPr>
+      <a:noFill/>
+      <a:ln w="9525" cap="flat" cmpd="sng" algn="ctr">
+        <a:solidFill>
+          <a:schemeClr val="tx1">
+            <a:lumMod val="15000"/>
+            <a:lumOff val="85000"/>
+          </a:schemeClr>
+        </a:solidFill>
+        <a:round/>
+      </a:ln>
+    </cs:spPr>
+    <cs:defRPr sz="1197" kern="1200"/>
+  </cs:dataTable>
+  <cs:downBar>
+    <cs:lnRef idx="0"/>
+    <cs:fillRef idx="0"/>
+    <cs:effectRef idx="0"/>
+    <cs:fontRef idx="minor">
+      <a:schemeClr val="dk1"/>
+    </cs:fontRef>
+    <cs:spPr>
+      <a:solidFill>
+        <a:schemeClr val="dk1">
+          <a:lumMod val="65000"/>
+          <a:lumOff val="35000"/>
+        </a:schemeClr>
+      </a:solidFill>
+      <a:ln w="9525">
+        <a:solidFill>
+          <a:schemeClr val="tx1">
+            <a:lumMod val="65000"/>
+            <a:lumOff val="35000"/>
+          </a:schemeClr>
+        </a:solidFill>
+      </a:ln>
+    </cs:spPr>
+  </cs:downBar>
+  <cs:dropLine>
+    <cs:lnRef idx="0"/>
+    <cs:fillRef idx="0"/>
+    <cs:effectRef idx="0"/>
+    <cs:fontRef idx="minor">
+      <a:schemeClr val="tx1"/>
+    </cs:fontRef>
+    <cs:spPr>
+      <a:ln w="9525" cap="flat" cmpd="sng" algn="ctr">
+        <a:solidFill>
+          <a:schemeClr val="tx1">
+            <a:lumMod val="35000"/>
+            <a:lumOff val="65000"/>
+          </a:schemeClr>
+        </a:solidFill>
+        <a:round/>
+      </a:ln>
+    </cs:spPr>
+  </cs:dropLine>
+  <cs:errorBar>
+    <cs:lnRef idx="0"/>
+    <cs:fillRef idx="0"/>
+    <cs:effectRef idx="0"/>
+    <cs:fontRef idx="minor">
+      <a:schemeClr val="tx1"/>
+    </cs:fontRef>
+    <cs:spPr>
+      <a:ln w="9525" cap="flat" cmpd="sng" algn="ctr">
+        <a:solidFill>
+          <a:schemeClr val="tx1">
+            <a:lumMod val="65000"/>
+            <a:lumOff val="35000"/>
+          </a:schemeClr>
+        </a:solidFill>
+        <a:round/>
+      </a:ln>
+    </cs:spPr>
+  </cs:errorBar>
+  <cs:floor>
+    <cs:lnRef idx="0"/>
+    <cs:fillRef idx="0"/>
+    <cs:effectRef idx="0"/>
+    <cs:fontRef idx="minor">
+      <a:schemeClr val="tx1"/>
+    </cs:fontRef>
+    <cs:spPr>
+      <a:noFill/>
+      <a:ln>
+        <a:noFill/>
+      </a:ln>
+    </cs:spPr>
+  </cs:floor>
+  <cs:gridlineMajor>
+    <cs:lnRef idx="0"/>
+    <cs:fillRef idx="0"/>
+    <cs:effectRef idx="0"/>
+    <cs:fontRef idx="minor">
+      <a:schemeClr val="tx1"/>
+    </cs:fontRef>
+    <cs:spPr>
+      <a:ln w="9525" cap="flat" cmpd="sng" algn="ctr">
+        <a:solidFill>
+          <a:schemeClr val="tx1">
+            <a:lumMod val="15000"/>
+            <a:lumOff val="85000"/>
+          </a:schemeClr>
+        </a:solidFill>
+        <a:round/>
+      </a:ln>
+    </cs:spPr>
+  </cs:gridlineMajor>
+  <cs:gridlineMinor>
+    <cs:lnRef idx="0"/>
+    <cs:fillRef idx="0"/>
+    <cs:effectRef idx="0"/>
+    <cs:fontRef idx="minor">
+      <a:schemeClr val="tx1"/>
+    </cs:fontRef>
+    <cs:spPr>
+      <a:ln w="9525" cap="flat" cmpd="sng" algn="ctr">
+        <a:solidFill>
+          <a:schemeClr val="tx1">
+            <a:lumMod val="5000"/>
+            <a:lumOff val="95000"/>
+          </a:schemeClr>
+        </a:solidFill>
+        <a:round/>
+      </a:ln>
+    </cs:spPr>
+  </cs:gridlineMinor>
+  <cs:hiLoLine>
+    <cs:lnRef idx="0"/>
+    <cs:fillRef idx="0"/>
+    <cs:effectRef idx="0"/>
+    <cs:fontRef idx="minor">
+      <a:schemeClr val="tx1"/>
+    </cs:fontRef>
+    <cs:spPr>
+      <a:ln w="9525" cap="flat" cmpd="sng" algn="ctr">
+        <a:solidFill>
+          <a:schemeClr val="tx1">
+            <a:lumMod val="75000"/>
+            <a:lumOff val="25000"/>
+          </a:schemeClr>
+        </a:solidFill>
+        <a:round/>
+      </a:ln>
+    </cs:spPr>
+  </cs:hiLoLine>
+  <cs:leaderLine>
+    <cs:lnRef idx="0"/>
+    <cs:fillRef idx="0"/>
+    <cs:effectRef idx="0"/>
+    <cs:fontRef idx="minor">
+      <a:schemeClr val="tx1"/>
+    </cs:fontRef>
+    <cs:spPr>
+      <a:ln w="9525" cap="flat" cmpd="sng" algn="ctr">
+        <a:solidFill>
+          <a:schemeClr val="tx1">
+            <a:lumMod val="35000"/>
+            <a:lumOff val="65000"/>
+          </a:schemeClr>
+        </a:solidFill>
+        <a:round/>
+      </a:ln>
+    </cs:spPr>
+  </cs:leaderLine>
+  <cs:legend>
+    <cs:lnRef idx="0"/>
+    <cs:fillRef idx="0"/>
+    <cs:effectRef idx="0"/>
+    <cs:fontRef idx="minor">
+      <a:schemeClr val="tx1">
+        <a:lumMod val="65000"/>
+        <a:lumOff val="35000"/>
+      </a:schemeClr>
+    </cs:fontRef>
+    <cs:defRPr sz="1197" kern="1200"/>
+  </cs:legend>
+  <cs:plotArea mods="allowNoFillOverride allowNoLineOverride">
+    <cs:lnRef idx="0"/>
+    <cs:fillRef idx="0"/>
+    <cs:effectRef idx="0"/>
+    <cs:fontRef idx="minor">
+      <a:schemeClr val="tx1"/>
+    </cs:fontRef>
+  </cs:plotArea>
+  <cs:plotArea3D mods="allowNoFillOverride allowNoLineOverride">
+    <cs:lnRef idx="0"/>
+    <cs:fillRef idx="0"/>
+    <cs:effectRef idx="0"/>
+    <cs:fontRef idx="minor">
+      <a:schemeClr val="tx1"/>
+    </cs:fontRef>
+  </cs:plotArea3D>
+  <cs:seriesAxis>
+    <cs:lnRef idx="0"/>
+    <cs:fillRef idx="0"/>
+    <cs:effectRef idx="0"/>
+    <cs:fontRef idx="minor">
+      <a:schemeClr val="tx1">
+        <a:lumMod val="65000"/>
+        <a:lumOff val="35000"/>
+      </a:schemeClr>
+    </cs:fontRef>
+    <cs:defRPr sz="1197" kern="1200"/>
+  </cs:seriesAxis>
+  <cs:seriesLine>
+    <cs:lnRef idx="0"/>
+    <cs:fillRef idx="0"/>
+    <cs:effectRef idx="0"/>
+    <cs:fontRef idx="minor">
+      <a:schemeClr val="tx1"/>
+    </cs:fontRef>
+    <cs:spPr>
+      <a:ln w="9525" cap="flat" cmpd="sng" algn="ctr">
+        <a:solidFill>
+          <a:schemeClr val="tx1">
+            <a:lumMod val="35000"/>
+            <a:lumOff val="65000"/>
+          </a:schemeClr>
+        </a:solidFill>
+        <a:round/>
+      </a:ln>
+    </cs:spPr>
+  </cs:seriesLine>
+  <cs:title>
+    <cs:lnRef idx="0"/>
+    <cs:fillRef idx="0"/>
+    <cs:effectRef idx="0"/>
+    <cs:fontRef idx="minor">
+      <a:schemeClr val="tx1">
+        <a:lumMod val="65000"/>
+        <a:lumOff val="35000"/>
+      </a:schemeClr>
+    </cs:fontRef>
+    <cs:defRPr sz="1862" b="0" kern="1200" spc="0" baseline="0"/>
+  </cs:title>
+  <cs:trendline>
+    <cs:lnRef idx="0">
+      <cs:styleClr val="auto"/>
+    </cs:lnRef>
+    <cs:fillRef idx="0"/>
+    <cs:effectRef idx="0"/>
+    <cs:fontRef idx="minor">
+      <a:schemeClr val="tx1"/>
+    </cs:fontRef>
+    <cs:spPr>
+      <a:ln w="19050" cap="rnd">
+        <a:solidFill>
+          <a:schemeClr val="phClr"/>
+        </a:solidFill>
+        <a:prstDash val="sysDot"/>
+      </a:ln>
+    </cs:spPr>
+  </cs:trendline>
+  <cs:trendlineLabel>
+    <cs:lnRef idx="0"/>
+    <cs:fillRef idx="0"/>
+    <cs:effectRef idx="0"/>
+    <cs:fontRef idx="minor">
+      <a:schemeClr val="tx1">
+        <a:lumMod val="65000"/>
+        <a:lumOff val="35000"/>
+      </a:schemeClr>
+    </cs:fontRef>
+    <cs:defRPr sz="1197" kern="1200"/>
+  </cs:trendlineLabel>
+  <cs:upBar>
+    <cs:lnRef idx="0"/>
+    <cs:fillRef idx="0"/>
+    <cs:effectRef idx="0"/>
+    <cs:fontRef idx="minor">
+      <a:schemeClr val="dk1"/>
+    </cs:fontRef>
+    <cs:spPr>
+      <a:solidFill>
+        <a:schemeClr val="lt1"/>
+      </a:solidFill>
+      <a:ln w="9525">
+        <a:solidFill>
+          <a:schemeClr val="tx1">
+            <a:lumMod val="15000"/>
+            <a:lumOff val="85000"/>
+          </a:schemeClr>
+        </a:solidFill>
+      </a:ln>
+    </cs:spPr>
+  </cs:upBar>
+  <cs:valueAxis>
+    <cs:lnRef idx="0"/>
+    <cs:fillRef idx="0"/>
+    <cs:effectRef idx="0"/>
+    <cs:fontRef idx="minor">
+      <a:schemeClr val="tx1">
+        <a:lumMod val="65000"/>
+        <a:lumOff val="35000"/>
+      </a:schemeClr>
+    </cs:fontRef>
+    <cs:defRPr sz="1197" kern="1200"/>
+  </cs:valueAxis>
+  <cs:wall>
+    <cs:lnRef idx="0"/>
+    <cs:fillRef idx="0"/>
+    <cs:effectRef idx="0"/>
+    <cs:fontRef idx="minor">
+      <a:schemeClr val="tx1"/>
+    </cs:fontRef>
+    <cs:spPr>
+      <a:noFill/>
+      <a:ln>
+        <a:noFill/>
+      </a:ln>
+    </cs:spPr>
+  </cs:wall>
+</cs:chartStyle>
+</file>
+
 <file path=ppt/handoutMasters/handoutMaster1.xml><?xml version="1.0" encoding="utf-8"?>
 <p:handoutMaster xmlns:a="http://schemas.openxmlformats.org/drawingml/2006/main" xmlns:r="http://schemas.openxmlformats.org/officeDocument/2006/relationships" xmlns:p="http://schemas.openxmlformats.org/presentationml/2006/main">
   <p:cSld>
@@ -6017,7 +7210,7 @@
             <a:pPr algn="r" rtl="0"/>
             <a:fld id="{221A1788-7372-4FAC-9AF0-00B54B8D9CBA}" type="datetime1">
               <a:rPr lang="it-IT" smtClean="0"/>
-              <a:t>16/12/2022</a:t>
+              <a:t>21/12/2022</a:t>
             </a:fld>
             <a:endParaRPr lang="it-IT" dirty="0"/>
           </a:p>
@@ -6187,7 +7380,7 @@
             <a:fld id="{D943A304-85CD-4257-B418-D8F889FE0DBC}" type="datetime1">
               <a:rPr lang="it-IT" smtClean="0"/>
               <a:pPr/>
-              <a:t>16/12/2022</a:t>
+              <a:t>21/12/2022</a:t>
             </a:fld>
             <a:endParaRPr lang="it-IT" dirty="0"/>
           </a:p>
@@ -7563,7 +8756,7 @@
             <a:fld id="{3EBA5BD7-F043-4D1B-AA17-CD412FC534DE}" type="slidenum">
               <a:rPr lang="it-IT" smtClean="0"/>
               <a:pPr/>
-              <a:t>19</a:t>
+              <a:t>20</a:t>
             </a:fld>
             <a:endParaRPr lang="it-IT" dirty="0"/>
           </a:p>
@@ -7755,7 +8948,7 @@
             <a:fld id="{3EBA5BD7-F043-4D1B-AA17-CD412FC534DE}" type="slidenum">
               <a:rPr lang="it-IT" smtClean="0"/>
               <a:pPr/>
-              <a:t>20</a:t>
+              <a:t>21</a:t>
             </a:fld>
             <a:endParaRPr lang="it-IT" dirty="0"/>
           </a:p>
@@ -7843,7 +9036,7 @@
             <a:fld id="{3EBA5BD7-F043-4D1B-AA17-CD412FC534DE}" type="slidenum">
               <a:rPr lang="it-IT" smtClean="0"/>
               <a:pPr/>
-              <a:t>21</a:t>
+              <a:t>22</a:t>
             </a:fld>
             <a:endParaRPr lang="it-IT" dirty="0"/>
           </a:p>
@@ -7947,7 +9140,7 @@
             <a:fld id="{3EBA5BD7-F043-4D1B-AA17-CD412FC534DE}" type="slidenum">
               <a:rPr lang="it-IT" smtClean="0"/>
               <a:pPr/>
-              <a:t>22</a:t>
+              <a:t>23</a:t>
             </a:fld>
             <a:endParaRPr lang="it-IT" dirty="0"/>
           </a:p>
@@ -9403,7 +10596,7 @@
             <a:fld id="{3889EF9B-A500-41B6-8F1C-893813E9A898}" type="datetime1">
               <a:rPr lang="it-IT" smtClean="0"/>
               <a:pPr/>
-              <a:t>16/12/2022</a:t>
+              <a:t>21/12/2022</a:t>
             </a:fld>
             <a:endParaRPr lang="it-IT" dirty="0"/>
           </a:p>
@@ -9609,7 +10802,7 @@
             <a:fld id="{6E724BBD-5BEA-4971-A6C4-42E94AF7CB5F}" type="datetime1">
               <a:rPr lang="it-IT" smtClean="0"/>
               <a:pPr/>
-              <a:t>16/12/2022</a:t>
+              <a:t>21/12/2022</a:t>
             </a:fld>
             <a:endParaRPr lang="it-IT" dirty="0"/>
           </a:p>
@@ -9825,7 +11018,7 @@
             <a:fld id="{EF1B2188-7D8C-43C8-B29F-60D01DE77B72}" type="datetime1">
               <a:rPr lang="it-IT" smtClean="0"/>
               <a:pPr/>
-              <a:t>16/12/2022</a:t>
+              <a:t>21/12/2022</a:t>
             </a:fld>
             <a:endParaRPr lang="it-IT" dirty="0"/>
           </a:p>
@@ -10031,7 +11224,7 @@
             <a:fld id="{581DC961-63CE-49AB-921E-1CE3DDEFC80A}" type="datetime1">
               <a:rPr lang="it-IT" smtClean="0"/>
               <a:pPr/>
-              <a:t>16/12/2022</a:t>
+              <a:t>21/12/2022</a:t>
             </a:fld>
             <a:endParaRPr lang="it-IT" dirty="0"/>
           </a:p>
@@ -10475,7 +11668,7 @@
             <a:fld id="{C6066F5F-3C86-4285-A86F-35EFBBDD7800}" type="datetime1">
               <a:rPr lang="it-IT" smtClean="0"/>
               <a:pPr/>
-              <a:t>16/12/2022</a:t>
+              <a:t>21/12/2022</a:t>
             </a:fld>
             <a:endParaRPr lang="it-IT" dirty="0"/>
           </a:p>
@@ -10787,7 +11980,7 @@
             <a:fld id="{0B9BE34E-14EC-4041-A597-EE22FC16794F}" type="datetime1">
               <a:rPr lang="it-IT" smtClean="0"/>
               <a:pPr/>
-              <a:t>16/12/2022</a:t>
+              <a:t>21/12/2022</a:t>
             </a:fld>
             <a:endParaRPr lang="it-IT" dirty="0"/>
           </a:p>
@@ -11251,7 +12444,7 @@
             <a:fld id="{D6FAD192-1BF7-4994-9CBA-74265F19F4C1}" type="datetime1">
               <a:rPr lang="it-IT" smtClean="0"/>
               <a:pPr/>
-              <a:t>16/12/2022</a:t>
+              <a:t>21/12/2022</a:t>
             </a:fld>
             <a:endParaRPr lang="it-IT" dirty="0"/>
           </a:p>
@@ -11389,7 +12582,7 @@
             <a:fld id="{C476DD40-7EBA-46D0-A855-62759524AC7A}" type="datetime1">
               <a:rPr lang="it-IT" smtClean="0"/>
               <a:pPr/>
-              <a:t>16/12/2022</a:t>
+              <a:t>21/12/2022</a:t>
             </a:fld>
             <a:endParaRPr lang="it-IT" dirty="0"/>
           </a:p>
@@ -11503,7 +12696,7 @@
             <a:fld id="{C62E4D95-88E1-4556-89BE-EC650C1D14A8}" type="datetime1">
               <a:rPr lang="it-IT" smtClean="0"/>
               <a:pPr/>
-              <a:t>16/12/2022</a:t>
+              <a:t>21/12/2022</a:t>
             </a:fld>
             <a:endParaRPr lang="it-IT" dirty="0"/>
           </a:p>
@@ -11810,7 +13003,7 @@
             <a:fld id="{1F9867D3-FC26-40B1-8BB9-B19FF8D6CD45}" type="datetime1">
               <a:rPr lang="it-IT" smtClean="0"/>
               <a:pPr/>
-              <a:t>16/12/2022</a:t>
+              <a:t>21/12/2022</a:t>
             </a:fld>
             <a:endParaRPr lang="it-IT" dirty="0"/>
           </a:p>
@@ -12107,7 +13300,7 @@
             <a:fld id="{5B0EE21F-92EE-4289-AFFB-9252D957F459}" type="datetime1">
               <a:rPr lang="it-IT" smtClean="0"/>
               <a:pPr/>
-              <a:t>16/12/2022</a:t>
+              <a:t>21/12/2022</a:t>
             </a:fld>
             <a:endParaRPr lang="it-IT" dirty="0"/>
           </a:p>
@@ -12731,7 +13924,7 @@
             <a:fld id="{8A756645-DD8C-4009-9A84-A4AD56EB55A9}" type="datetime1">
               <a:rPr lang="it-IT" smtClean="0"/>
               <a:pPr/>
-              <a:t>16/12/2022</a:t>
+              <a:t>21/12/2022</a:t>
             </a:fld>
             <a:endParaRPr lang="it-IT" dirty="0"/>
           </a:p>
@@ -14737,7 +15930,7 @@
             <p:ph idx="1"/>
             <p:extLst>
               <p:ext uri="{D42A27DB-BD31-4B8C-83A1-F6EECF244321}">
-                <p14:modId xmlns:p14="http://schemas.microsoft.com/office/powerpoint/2010/main" val="477563688"/>
+                <p14:modId xmlns:p14="http://schemas.microsoft.com/office/powerpoint/2010/main" val="2047265283"/>
               </p:ext>
             </p:extLst>
           </p:nvPr>
@@ -14829,12 +16022,43 @@
           <a:chExt cx="0" cy="0"/>
         </a:xfrm>
       </p:grpSpPr>
+      <p:graphicFrame>
+        <p:nvGraphicFramePr>
+          <p:cNvPr id="6" name="Segnaposto contenuto 5">
+            <a:extLst>
+              <a:ext uri="{FF2B5EF4-FFF2-40B4-BE49-F238E27FC236}">
+                <a16:creationId xmlns:a16="http://schemas.microsoft.com/office/drawing/2014/main" id="{0EAAB151-DF69-A4B0-8D6C-36A62334568B}"/>
+              </a:ext>
+            </a:extLst>
+          </p:cNvPr>
+          <p:cNvGraphicFramePr>
+            <a:graphicFrameLocks noGrp="1"/>
+          </p:cNvGraphicFramePr>
+          <p:nvPr>
+            <p:ph idx="1"/>
+            <p:extLst>
+              <p:ext uri="{D42A27DB-BD31-4B8C-83A1-F6EECF244321}">
+                <p14:modId xmlns:p14="http://schemas.microsoft.com/office/powerpoint/2010/main" val="414746683"/>
+              </p:ext>
+            </p:extLst>
+          </p:nvPr>
+        </p:nvGraphicFramePr>
+        <p:xfrm>
+          <a:off x="1219120" y="1700808"/>
+          <a:ext cx="10360025" cy="4462463"/>
+        </p:xfrm>
+        <a:graphic>
+          <a:graphicData uri="http://schemas.openxmlformats.org/drawingml/2006/chart">
+            <c:chart xmlns:c="http://schemas.openxmlformats.org/drawingml/2006/chart" xmlns:r="http://schemas.openxmlformats.org/officeDocument/2006/relationships" r:id="rId2"/>
+          </a:graphicData>
+        </a:graphic>
+      </p:graphicFrame>
       <p:sp>
         <p:nvSpPr>
-          <p:cNvPr id="2" name="Titolo 1">
+          <p:cNvPr id="7" name="Titolo 1">
             <a:extLst>
               <a:ext uri="{FF2B5EF4-FFF2-40B4-BE49-F238E27FC236}">
-                <a16:creationId xmlns:a16="http://schemas.microsoft.com/office/drawing/2014/main" id="{6A0A504D-4A70-0F72-8FB5-F008D2379ACE}"/>
+                <a16:creationId xmlns:a16="http://schemas.microsoft.com/office/drawing/2014/main" id="{88B3B62F-1360-4C24-04AB-BDCF01AC2273}"/>
               </a:ext>
             </a:extLst>
           </p:cNvPr>
@@ -14845,7 +16069,12 @@
             <p:ph type="title"/>
           </p:nvPr>
         </p:nvSpPr>
-        <p:spPr/>
+        <p:spPr>
+          <a:xfrm>
+            <a:off x="1218883" y="274637"/>
+            <a:ext cx="10360501" cy="1223963"/>
+          </a:xfrm>
+        </p:spPr>
         <p:txBody>
           <a:bodyPr>
             <a:normAutofit/>
@@ -14859,41 +16088,10 @@
           </a:p>
         </p:txBody>
       </p:sp>
-      <p:graphicFrame>
-        <p:nvGraphicFramePr>
-          <p:cNvPr id="6" name="Segnaposto contenuto 5">
-            <a:extLst>
-              <a:ext uri="{FF2B5EF4-FFF2-40B4-BE49-F238E27FC236}">
-                <a16:creationId xmlns:a16="http://schemas.microsoft.com/office/drawing/2014/main" id="{E49BEF51-F44F-57A0-B022-C62079CA6C88}"/>
-              </a:ext>
-            </a:extLst>
-          </p:cNvPr>
-          <p:cNvGraphicFramePr>
-            <a:graphicFrameLocks noGrp="1"/>
-          </p:cNvGraphicFramePr>
-          <p:nvPr>
-            <p:ph idx="1"/>
-            <p:extLst>
-              <p:ext uri="{D42A27DB-BD31-4B8C-83A1-F6EECF244321}">
-                <p14:modId xmlns:p14="http://schemas.microsoft.com/office/powerpoint/2010/main" val="1987298813"/>
-              </p:ext>
-            </p:extLst>
-          </p:nvPr>
-        </p:nvGraphicFramePr>
-        <p:xfrm>
-          <a:off x="1219200" y="1124744"/>
-          <a:ext cx="10360025" cy="5458619"/>
-        </p:xfrm>
-        <a:graphic>
-          <a:graphicData uri="http://schemas.openxmlformats.org/drawingml/2006/chart">
-            <c:chart xmlns:c="http://schemas.openxmlformats.org/drawingml/2006/chart" xmlns:r="http://schemas.openxmlformats.org/officeDocument/2006/relationships" r:id="rId3"/>
-          </a:graphicData>
-        </a:graphic>
-      </p:graphicFrame>
     </p:spTree>
     <p:extLst>
       <p:ext uri="{BB962C8B-B14F-4D97-AF65-F5344CB8AC3E}">
-        <p14:creationId xmlns:p14="http://schemas.microsoft.com/office/powerpoint/2010/main" val="263596931"/>
+        <p14:creationId xmlns:p14="http://schemas.microsoft.com/office/powerpoint/2010/main" val="932521049"/>
       </p:ext>
     </p:extLst>
   </p:cSld>
@@ -15042,6 +16240,109 @@
           <a:chExt cx="0" cy="0"/>
         </a:xfrm>
       </p:grpSpPr>
+      <p:sp>
+        <p:nvSpPr>
+          <p:cNvPr id="2" name="Titolo 1">
+            <a:extLst>
+              <a:ext uri="{FF2B5EF4-FFF2-40B4-BE49-F238E27FC236}">
+                <a16:creationId xmlns:a16="http://schemas.microsoft.com/office/drawing/2014/main" id="{6A0A504D-4A70-0F72-8FB5-F008D2379ACE}"/>
+              </a:ext>
+            </a:extLst>
+          </p:cNvPr>
+          <p:cNvSpPr>
+            <a:spLocks noGrp="1"/>
+          </p:cNvSpPr>
+          <p:nvPr>
+            <p:ph type="title"/>
+          </p:nvPr>
+        </p:nvSpPr>
+        <p:spPr/>
+        <p:txBody>
+          <a:bodyPr>
+            <a:normAutofit/>
+          </a:bodyPr>
+          <a:lstStyle/>
+          <a:p>
+            <a:r>
+              <a:rPr lang="it-IT" sz="5400" dirty="0"/>
+              <a:t>Risultati</a:t>
+            </a:r>
+          </a:p>
+        </p:txBody>
+      </p:sp>
+      <p:graphicFrame>
+        <p:nvGraphicFramePr>
+          <p:cNvPr id="6" name="Segnaposto contenuto 5">
+            <a:extLst>
+              <a:ext uri="{FF2B5EF4-FFF2-40B4-BE49-F238E27FC236}">
+                <a16:creationId xmlns:a16="http://schemas.microsoft.com/office/drawing/2014/main" id="{E49BEF51-F44F-57A0-B022-C62079CA6C88}"/>
+              </a:ext>
+            </a:extLst>
+          </p:cNvPr>
+          <p:cNvGraphicFramePr>
+            <a:graphicFrameLocks noGrp="1"/>
+          </p:cNvGraphicFramePr>
+          <p:nvPr>
+            <p:ph idx="1"/>
+            <p:extLst>
+              <p:ext uri="{D42A27DB-BD31-4B8C-83A1-F6EECF244321}">
+                <p14:modId xmlns:p14="http://schemas.microsoft.com/office/powerpoint/2010/main" val="71385479"/>
+              </p:ext>
+            </p:extLst>
+          </p:nvPr>
+        </p:nvGraphicFramePr>
+        <p:xfrm>
+          <a:off x="1219200" y="1124744"/>
+          <a:ext cx="10360025" cy="5458619"/>
+        </p:xfrm>
+        <a:graphic>
+          <a:graphicData uri="http://schemas.openxmlformats.org/drawingml/2006/chart">
+            <c:chart xmlns:c="http://schemas.openxmlformats.org/drawingml/2006/chart" xmlns:r="http://schemas.openxmlformats.org/officeDocument/2006/relationships" r:id="rId3"/>
+          </a:graphicData>
+        </a:graphic>
+      </p:graphicFrame>
+    </p:spTree>
+    <p:extLst>
+      <p:ext uri="{BB962C8B-B14F-4D97-AF65-F5344CB8AC3E}">
+        <p14:creationId xmlns:p14="http://schemas.microsoft.com/office/powerpoint/2010/main" val="263596931"/>
+      </p:ext>
+    </p:extLst>
+  </p:cSld>
+  <p:clrMapOvr>
+    <a:masterClrMapping/>
+  </p:clrMapOvr>
+  <mc:AlternateContent xmlns:mc="http://schemas.openxmlformats.org/markup-compatibility/2006" xmlns:p14="http://schemas.microsoft.com/office/powerpoint/2010/main">
+    <mc:Choice Requires="p14">
+      <p:transition spd="med" p14:dur="700">
+        <p:fade/>
+      </p:transition>
+    </mc:Choice>
+    <mc:Fallback xmlns="">
+      <p:transition spd="med">
+        <p:fade/>
+      </p:transition>
+    </mc:Fallback>
+  </mc:AlternateContent>
+</p:sld>
+</file>
+
+<file path=ppt/slides/slide21.xml><?xml version="1.0" encoding="utf-8"?>
+<p:sld xmlns:a="http://schemas.openxmlformats.org/drawingml/2006/main" xmlns:r="http://schemas.openxmlformats.org/officeDocument/2006/relationships" xmlns:p="http://schemas.openxmlformats.org/presentationml/2006/main">
+  <p:cSld>
+    <p:spTree>
+      <p:nvGrpSpPr>
+        <p:cNvPr id="1" name=""/>
+        <p:cNvGrpSpPr/>
+        <p:nvPr/>
+      </p:nvGrpSpPr>
+      <p:grpSpPr>
+        <a:xfrm>
+          <a:off x="0" y="0"/>
+          <a:ext cx="0" cy="0"/>
+          <a:chOff x="0" y="0"/>
+          <a:chExt cx="0" cy="0"/>
+        </a:xfrm>
+      </p:grpSpPr>
       <p:graphicFrame>
         <p:nvGraphicFramePr>
           <p:cNvPr id="7" name="Segnaposto contenuto 6">
@@ -15058,7 +16359,7 @@
             <p:ph idx="1"/>
             <p:extLst>
               <p:ext uri="{D42A27DB-BD31-4B8C-83A1-F6EECF244321}">
-                <p14:modId xmlns:p14="http://schemas.microsoft.com/office/powerpoint/2010/main" val="3886068189"/>
+                <p14:modId xmlns:p14="http://schemas.microsoft.com/office/powerpoint/2010/main" val="125758696"/>
               </p:ext>
             </p:extLst>
           </p:nvPr>
@@ -15112,123 +16413,6 @@
     <p:extLst>
       <p:ext uri="{BB962C8B-B14F-4D97-AF65-F5344CB8AC3E}">
         <p14:creationId xmlns:p14="http://schemas.microsoft.com/office/powerpoint/2010/main" val="3410057557"/>
-      </p:ext>
-    </p:extLst>
-  </p:cSld>
-  <p:clrMapOvr>
-    <a:masterClrMapping/>
-  </p:clrMapOvr>
-  <mc:AlternateContent xmlns:mc="http://schemas.openxmlformats.org/markup-compatibility/2006" xmlns:p14="http://schemas.microsoft.com/office/powerpoint/2010/main">
-    <mc:Choice Requires="p14">
-      <p:transition spd="med" p14:dur="700">
-        <p:fade/>
-      </p:transition>
-    </mc:Choice>
-    <mc:Fallback xmlns="">
-      <p:transition spd="med">
-        <p:fade/>
-      </p:transition>
-    </mc:Fallback>
-  </mc:AlternateContent>
-</p:sld>
-</file>
-
-<file path=ppt/slides/slide21.xml><?xml version="1.0" encoding="utf-8"?>
-<p:sld xmlns:a="http://schemas.openxmlformats.org/drawingml/2006/main" xmlns:r="http://schemas.openxmlformats.org/officeDocument/2006/relationships" xmlns:p="http://schemas.openxmlformats.org/presentationml/2006/main">
-  <p:cSld>
-    <p:spTree>
-      <p:nvGrpSpPr>
-        <p:cNvPr id="1" name=""/>
-        <p:cNvGrpSpPr/>
-        <p:nvPr/>
-      </p:nvGrpSpPr>
-      <p:grpSpPr>
-        <a:xfrm>
-          <a:off x="0" y="0"/>
-          <a:ext cx="0" cy="0"/>
-          <a:chOff x="0" y="0"/>
-          <a:chExt cx="0" cy="0"/>
-        </a:xfrm>
-      </p:grpSpPr>
-      <p:sp>
-        <p:nvSpPr>
-          <p:cNvPr id="2" name="Titolo 1">
-            <a:extLst>
-              <a:ext uri="{FF2B5EF4-FFF2-40B4-BE49-F238E27FC236}">
-                <a16:creationId xmlns:a16="http://schemas.microsoft.com/office/drawing/2014/main" id="{9691F2C9-38FB-B557-20C5-39409A86B6F4}"/>
-              </a:ext>
-            </a:extLst>
-          </p:cNvPr>
-          <p:cNvSpPr>
-            <a:spLocks noGrp="1"/>
-          </p:cNvSpPr>
-          <p:nvPr>
-            <p:ph type="title"/>
-          </p:nvPr>
-        </p:nvSpPr>
-        <p:spPr/>
-        <p:txBody>
-          <a:bodyPr>
-            <a:normAutofit/>
-          </a:bodyPr>
-          <a:lstStyle/>
-          <a:p>
-            <a:r>
-              <a:rPr lang="it-IT" sz="5400" dirty="0"/>
-              <a:t>Conclusioni</a:t>
-            </a:r>
-          </a:p>
-        </p:txBody>
-      </p:sp>
-      <p:sp>
-        <p:nvSpPr>
-          <p:cNvPr id="3" name="Segnaposto contenuto 2">
-            <a:extLst>
-              <a:ext uri="{FF2B5EF4-FFF2-40B4-BE49-F238E27FC236}">
-                <a16:creationId xmlns:a16="http://schemas.microsoft.com/office/drawing/2014/main" id="{D11B1E8F-E764-5C8F-EAA7-5E71D193E5D0}"/>
-              </a:ext>
-            </a:extLst>
-          </p:cNvPr>
-          <p:cNvSpPr>
-            <a:spLocks noGrp="1"/>
-          </p:cNvSpPr>
-          <p:nvPr>
-            <p:ph idx="1"/>
-          </p:nvPr>
-        </p:nvSpPr>
-        <p:spPr/>
-        <p:txBody>
-          <a:bodyPr>
-            <a:normAutofit/>
-          </a:bodyPr>
-          <a:lstStyle/>
-          <a:p>
-            <a:pPr marL="0" indent="0">
-              <a:buNone/>
-            </a:pPr>
-            <a:r>
-              <a:rPr lang="it-IT" sz="3600" dirty="0"/>
-              <a:t>L’algoritmo finale è in grado di comprimere molto bene file di testo con un tasso di compressione che si aggira intorno al 50%, impiegando </a:t>
-            </a:r>
-            <a:r>
-              <a:rPr lang="it-IT" sz="3600" dirty="0" err="1"/>
-              <a:t>Huffman</a:t>
-            </a:r>
-            <a:r>
-              <a:rPr lang="it-IT" sz="3600"/>
-              <a:t>, LZW o AC. </a:t>
-            </a:r>
-            <a:r>
-              <a:rPr lang="it-IT" sz="3600" dirty="0"/>
-              <a:t>Il suo utilizzo garantisce un buon grado di sicurezza in ambito cloud.</a:t>
-            </a:r>
-          </a:p>
-        </p:txBody>
-      </p:sp>
-    </p:spTree>
-    <p:extLst>
-      <p:ext uri="{BB962C8B-B14F-4D97-AF65-F5344CB8AC3E}">
-        <p14:creationId xmlns:p14="http://schemas.microsoft.com/office/powerpoint/2010/main" val="2296740541"/>
       </p:ext>
     </p:extLst>
   </p:cSld>
@@ -15272,6 +16456,123 @@
           <p:cNvPr id="2" name="Titolo 1">
             <a:extLst>
               <a:ext uri="{FF2B5EF4-FFF2-40B4-BE49-F238E27FC236}">
+                <a16:creationId xmlns:a16="http://schemas.microsoft.com/office/drawing/2014/main" id="{9691F2C9-38FB-B557-20C5-39409A86B6F4}"/>
+              </a:ext>
+            </a:extLst>
+          </p:cNvPr>
+          <p:cNvSpPr>
+            <a:spLocks noGrp="1"/>
+          </p:cNvSpPr>
+          <p:nvPr>
+            <p:ph type="title"/>
+          </p:nvPr>
+        </p:nvSpPr>
+        <p:spPr/>
+        <p:txBody>
+          <a:bodyPr>
+            <a:normAutofit/>
+          </a:bodyPr>
+          <a:lstStyle/>
+          <a:p>
+            <a:r>
+              <a:rPr lang="it-IT" sz="5400" dirty="0"/>
+              <a:t>Conclusioni</a:t>
+            </a:r>
+          </a:p>
+        </p:txBody>
+      </p:sp>
+      <p:sp>
+        <p:nvSpPr>
+          <p:cNvPr id="3" name="Segnaposto contenuto 2">
+            <a:extLst>
+              <a:ext uri="{FF2B5EF4-FFF2-40B4-BE49-F238E27FC236}">
+                <a16:creationId xmlns:a16="http://schemas.microsoft.com/office/drawing/2014/main" id="{D11B1E8F-E764-5C8F-EAA7-5E71D193E5D0}"/>
+              </a:ext>
+            </a:extLst>
+          </p:cNvPr>
+          <p:cNvSpPr>
+            <a:spLocks noGrp="1"/>
+          </p:cNvSpPr>
+          <p:nvPr>
+            <p:ph idx="1"/>
+          </p:nvPr>
+        </p:nvSpPr>
+        <p:spPr/>
+        <p:txBody>
+          <a:bodyPr>
+            <a:normAutofit/>
+          </a:bodyPr>
+          <a:lstStyle/>
+          <a:p>
+            <a:pPr marL="0" indent="0">
+              <a:buNone/>
+            </a:pPr>
+            <a:r>
+              <a:rPr lang="it-IT" sz="3600" dirty="0"/>
+              <a:t>L’algoritmo finale è in grado di comprimere molto bene file di testo con un tasso di compressione che si aggira intorno al 50%, impiegando </a:t>
+            </a:r>
+            <a:r>
+              <a:rPr lang="it-IT" sz="3600" dirty="0" err="1"/>
+              <a:t>Huffman</a:t>
+            </a:r>
+            <a:r>
+              <a:rPr lang="it-IT" sz="3600"/>
+              <a:t>, LZW o AC. </a:t>
+            </a:r>
+            <a:r>
+              <a:rPr lang="it-IT" sz="3600" dirty="0"/>
+              <a:t>Il suo utilizzo garantisce un buon grado di sicurezza in ambito cloud.</a:t>
+            </a:r>
+          </a:p>
+        </p:txBody>
+      </p:sp>
+    </p:spTree>
+    <p:extLst>
+      <p:ext uri="{BB962C8B-B14F-4D97-AF65-F5344CB8AC3E}">
+        <p14:creationId xmlns:p14="http://schemas.microsoft.com/office/powerpoint/2010/main" val="2296740541"/>
+      </p:ext>
+    </p:extLst>
+  </p:cSld>
+  <p:clrMapOvr>
+    <a:masterClrMapping/>
+  </p:clrMapOvr>
+  <mc:AlternateContent xmlns:mc="http://schemas.openxmlformats.org/markup-compatibility/2006" xmlns:p14="http://schemas.microsoft.com/office/powerpoint/2010/main">
+    <mc:Choice Requires="p14">
+      <p:transition spd="med" p14:dur="700">
+        <p:fade/>
+      </p:transition>
+    </mc:Choice>
+    <mc:Fallback xmlns="">
+      <p:transition spd="med">
+        <p:fade/>
+      </p:transition>
+    </mc:Fallback>
+  </mc:AlternateContent>
+</p:sld>
+</file>
+
+<file path=ppt/slides/slide23.xml><?xml version="1.0" encoding="utf-8"?>
+<p:sld xmlns:a="http://schemas.openxmlformats.org/drawingml/2006/main" xmlns:r="http://schemas.openxmlformats.org/officeDocument/2006/relationships" xmlns:p="http://schemas.openxmlformats.org/presentationml/2006/main">
+  <p:cSld>
+    <p:spTree>
+      <p:nvGrpSpPr>
+        <p:cNvPr id="1" name=""/>
+        <p:cNvGrpSpPr/>
+        <p:nvPr/>
+      </p:nvGrpSpPr>
+      <p:grpSpPr>
+        <a:xfrm>
+          <a:off x="0" y="0"/>
+          <a:ext cx="0" cy="0"/>
+          <a:chOff x="0" y="0"/>
+          <a:chExt cx="0" cy="0"/>
+        </a:xfrm>
+      </p:grpSpPr>
+      <p:sp>
+        <p:nvSpPr>
+          <p:cNvPr id="2" name="Titolo 1">
+            <a:extLst>
+              <a:ext uri="{FF2B5EF4-FFF2-40B4-BE49-F238E27FC236}">
                 <a16:creationId xmlns:a16="http://schemas.microsoft.com/office/drawing/2014/main" id="{83B97289-B130-0A5C-E24E-D160478A0599}"/>
               </a:ext>
             </a:extLst>
@@ -15377,7 +16678,7 @@
 </p:sld>
 </file>
 
-<file path=ppt/slides/slide23.xml><?xml version="1.0" encoding="utf-8"?>
+<file path=ppt/slides/slide24.xml><?xml version="1.0" encoding="utf-8"?>
 <p:sld xmlns:a="http://schemas.openxmlformats.org/drawingml/2006/main" xmlns:r="http://schemas.openxmlformats.org/officeDocument/2006/relationships" xmlns:p="http://schemas.openxmlformats.org/presentationml/2006/main">
   <p:cSld>
     <p:spTree>
@@ -17637,6 +18938,15 @@
 </file>
 
 <file path=customXml/item1.xml><?xml version="1.0" encoding="utf-8"?>
+<?mso-contentType ?>
+<FormTemplates xmlns="http://schemas.microsoft.com/sharepoint/v3/contenttype/forms">
+  <Display>DocumentLibraryForm</Display>
+  <Edit>AssetEditForm</Edit>
+  <New>DocumentLibraryForm</New>
+</FormTemplates>
+</file>
+
+<file path=customXml/item2.xml><?xml version="1.0" encoding="utf-8"?>
 <ct:contentTypeSchema xmlns:ct="http://schemas.microsoft.com/office/2006/metadata/contentType" xmlns:ma="http://schemas.microsoft.com/office/2006/metadata/properties/metaAttributes" ct:_="" ma:_="" ma:contentTypeName="TemplateFile" ma:contentTypeID="0x0101006EDDDB5EE6D98C44930B742096920B300400F5B6D36B3EF94B4E9A635CDF2A18F5B8" ma:contentTypeVersion="72" ma:contentTypeDescription="Create a new document." ma:contentTypeScope="" ma:versionID="a23e56308344d904b51738559c3d67c9">
   <xsd:schema xmlns:xsd="http://www.w3.org/2001/XMLSchema" xmlns:xs="http://www.w3.org/2001/XMLSchema" xmlns:p="http://schemas.microsoft.com/office/2006/metadata/properties" xmlns:ns2="4873beb7-5857-4685-be1f-d57550cc96cc" targetNamespace="http://schemas.microsoft.com/office/2006/metadata/properties" ma:root="true" ma:fieldsID="cd0908cc4600e77bf5da051303e00c8d" ns2:_="">
     <xsd:import namespace="4873beb7-5857-4685-be1f-d57550cc96cc"/>
@@ -18676,15 +19986,6 @@
 </ct:contentTypeSchema>
 </file>
 
-<file path=customXml/item2.xml><?xml version="1.0" encoding="utf-8"?>
-<?mso-contentType ?>
-<FormTemplates xmlns="http://schemas.microsoft.com/sharepoint/v3/contenttype/forms">
-  <Display>DocumentLibraryForm</Display>
-  <Edit>AssetEditForm</Edit>
-  <New>DocumentLibraryForm</New>
-</FormTemplates>
-</file>
-
 <file path=customXml/item3.xml><?xml version="1.0" encoding="utf-8"?>
 <p:properties xmlns:p="http://schemas.microsoft.com/office/2006/metadata/properties" xmlns:xsi="http://www.w3.org/2001/XMLSchema-instance" xmlns:pc="http://schemas.microsoft.com/office/infopath/2007/PartnerControls">
   <documentManagement>
@@ -18822,6 +20123,14 @@
 </file>
 
 <file path=customXml/itemProps1.xml><?xml version="1.0" encoding="utf-8"?>
+<ds:datastoreItem xmlns:ds="http://schemas.openxmlformats.org/officeDocument/2006/customXml" ds:itemID="{3836F65B-1B07-41EE-A0E8-BC6EF3855225}">
+  <ds:schemaRefs>
+    <ds:schemaRef ds:uri="http://schemas.microsoft.com/sharepoint/v3/contenttype/forms"/>
+  </ds:schemaRefs>
+</ds:datastoreItem>
+</file>
+
+<file path=customXml/itemProps2.xml><?xml version="1.0" encoding="utf-8"?>
 <ds:datastoreItem xmlns:ds="http://schemas.openxmlformats.org/officeDocument/2006/customXml" ds:itemID="{A09BF4D4-EF60-4196-BFC3-9462D607978C}">
   <ds:schemaRefs>
     <ds:schemaRef ds:uri="http://schemas.microsoft.com/office/2006/metadata/contentType"/>
@@ -18835,14 +20144,6 @@
     <ds:schemaRef ds:uri="http://purl.org/dc/elements/1.1/"/>
     <ds:schemaRef ds:uri="http://purl.org/dc/terms/"/>
     <ds:schemaRef ds:uri="http://schemas.microsoft.com/internal/obd"/>
-  </ds:schemaRefs>
-</ds:datastoreItem>
-</file>
-
-<file path=customXml/itemProps2.xml><?xml version="1.0" encoding="utf-8"?>
-<ds:datastoreItem xmlns:ds="http://schemas.openxmlformats.org/officeDocument/2006/customXml" ds:itemID="{3836F65B-1B07-41EE-A0E8-BC6EF3855225}">
-  <ds:schemaRefs>
-    <ds:schemaRef ds:uri="http://schemas.microsoft.com/sharepoint/v3/contenttype/forms"/>
   </ds:schemaRefs>
 </ds:datastoreItem>
 </file>

</xml_diff>